<commit_message>
basic design is writting.
</commit_message>
<xml_diff>
--- a/document/企画書.pptx
+++ b/document/企画書.pptx
@@ -11,8 +11,7 @@
     <p:sldId id="259" r:id="rId5"/>
     <p:sldId id="261" r:id="rId6"/>
     <p:sldId id="262" r:id="rId7"/>
-    <p:sldId id="263" r:id="rId8"/>
-    <p:sldId id="265" r:id="rId9"/>
+    <p:sldId id="265" r:id="rId8"/>
   </p:sldIdLst>
   <p:sldSz cx="12192000" cy="6858000"/>
   <p:notesSz cx="6858000" cy="9144000"/>
@@ -426,7 +425,7 @@
           <a:p>
             <a:fld id="{12241623-A064-4BED-B073-BA4D61433402}" type="datetime1">
               <a:rPr lang="en-US" smtClean="0"/>
-              <a:t>2/1/2022</a:t>
+              <a:t>2/8/2022</a:t>
             </a:fld>
             <a:endParaRPr lang="en-US" dirty="0"/>
           </a:p>
@@ -1237,7 +1236,7 @@
           <a:p>
             <a:fld id="{6F86ED0C-1DA7-41F0-94CF-6218B1FEDFF1}" type="datetime1">
               <a:rPr lang="en-US" smtClean="0"/>
-              <a:t>2/1/2022</a:t>
+              <a:t>2/8/2022</a:t>
             </a:fld>
             <a:endParaRPr lang="en-US" dirty="0"/>
           </a:p>
@@ -1436,7 +1435,7 @@
           <a:p>
             <a:fld id="{EECF02AB-6034-4B88-BC5A-7C17CB0EF809}" type="datetime1">
               <a:rPr lang="en-US" smtClean="0"/>
-              <a:t>2/1/2022</a:t>
+              <a:t>2/8/2022</a:t>
             </a:fld>
             <a:endParaRPr lang="en-US" dirty="0"/>
           </a:p>
@@ -1671,7 +1670,7 @@
           <a:p>
             <a:fld id="{22F3E5F3-28EE-488F-BD53-B744C06C3DEC}" type="datetime1">
               <a:rPr lang="en-US" smtClean="0"/>
-              <a:t>2/1/2022</a:t>
+              <a:t>2/8/2022</a:t>
             </a:fld>
             <a:endParaRPr lang="en-US" dirty="0"/>
           </a:p>
@@ -4364,7 +4363,7 @@
           <a:p>
             <a:fld id="{E72EB70D-CD01-44DA-83B3-8FEB3383D307}" type="datetime1">
               <a:rPr lang="en-US" smtClean="0"/>
-              <a:t>2/1/2022</a:t>
+              <a:t>2/8/2022</a:t>
             </a:fld>
             <a:endParaRPr lang="en-US" dirty="0"/>
           </a:p>
@@ -4560,7 +4559,7 @@
           <a:p>
             <a:fld id="{D0158CFD-9357-46BE-A189-D637A67C8730}" type="datetime1">
               <a:rPr lang="en-US" smtClean="0"/>
-              <a:t>2/1/2022</a:t>
+              <a:t>2/8/2022</a:t>
             </a:fld>
             <a:endParaRPr lang="en-US" dirty="0"/>
           </a:p>
@@ -4949,7 +4948,7 @@
           <a:p>
             <a:fld id="{7B4742EE-B331-4632-BD10-A82FED6B6FC0}" type="datetime1">
               <a:rPr lang="en-US" smtClean="0"/>
-              <a:t>2/1/2022</a:t>
+              <a:t>2/8/2022</a:t>
             </a:fld>
             <a:endParaRPr lang="en-US" dirty="0"/>
           </a:p>
@@ -5115,7 +5114,7 @@
           <a:p>
             <a:fld id="{451BA835-D13F-49F4-8F11-5D576AC65FAD}" type="datetime1">
               <a:rPr lang="en-US" smtClean="0"/>
-              <a:t>2/1/2022</a:t>
+              <a:t>2/8/2022</a:t>
             </a:fld>
             <a:endParaRPr lang="en-US" dirty="0"/>
           </a:p>
@@ -5238,7 +5237,7 @@
           <a:p>
             <a:fld id="{ADBD1799-ACB5-4CB2-86A2-5C574F1C8706}" type="datetime1">
               <a:rPr lang="en-US" smtClean="0"/>
-              <a:t>2/1/2022</a:t>
+              <a:t>2/8/2022</a:t>
             </a:fld>
             <a:endParaRPr lang="en-US" dirty="0"/>
           </a:p>
@@ -5548,7 +5547,7 @@
           <a:p>
             <a:fld id="{ED5DD0D6-7A82-473E-879B-C6ECD6CCCFEC}" type="datetime1">
               <a:rPr lang="en-US" smtClean="0"/>
-              <a:t>2/1/2022</a:t>
+              <a:t>2/8/2022</a:t>
             </a:fld>
             <a:endParaRPr lang="en-US" dirty="0"/>
           </a:p>
@@ -5848,7 +5847,7 @@
           <a:p>
             <a:fld id="{D4605E03-BC17-41A7-854C-DFAB672737DC}" type="datetime1">
               <a:rPr lang="en-US" smtClean="0"/>
-              <a:t>2/1/2022</a:t>
+              <a:t>2/8/2022</a:t>
             </a:fld>
             <a:endParaRPr lang="en-US" dirty="0"/>
           </a:p>
@@ -6100,7 +6099,7 @@
           <a:p>
             <a:fld id="{C4408324-A84C-4A45-93B6-78D079CCE772}" type="datetime1">
               <a:rPr lang="en-US" smtClean="0"/>
-              <a:t>2/1/2022</a:t>
+              <a:t>2/8/2022</a:t>
             </a:fld>
             <a:endParaRPr lang="en-US" dirty="0"/>
           </a:p>
@@ -8013,16 +8012,6 @@
             </a:r>
             <a:endParaRPr kumimoji="1" lang="en-US" altLang="ja-JP" dirty="0"/>
           </a:p>
-          <a:p>
-            <a:endParaRPr kumimoji="1" lang="en-US" altLang="ja-JP" dirty="0"/>
-          </a:p>
-          <a:p>
-            <a:r>
-              <a:rPr kumimoji="1" lang="ja-JP" altLang="en-US" dirty="0"/>
-              <a:t>・懸念点</a:t>
-            </a:r>
-            <a:endParaRPr kumimoji="1" lang="en-US" altLang="ja-JP" dirty="0"/>
-          </a:p>
         </p:txBody>
       </p:sp>
     </p:spTree>
@@ -8377,11 +8366,30 @@
             </a:r>
             <a:r>
               <a:rPr kumimoji="1" lang="ja-JP" altLang="en-US" dirty="0"/>
-              <a:t>月</a:t>
+              <a:t>月 </a:t>
             </a:r>
             <a:r>
               <a:rPr kumimoji="1" lang="en-US" altLang="ja-JP" dirty="0"/>
-              <a:t>~4</a:t>
+              <a:t>=&gt; </a:t>
+            </a:r>
+            <a:r>
+              <a:rPr kumimoji="1" lang="en-US" altLang="ja-JP" dirty="0" err="1"/>
+              <a:t>BootStrap</a:t>
+            </a:r>
+            <a:r>
+              <a:rPr kumimoji="1" lang="ja-JP" altLang="en-US" dirty="0"/>
+              <a:t>勉強</a:t>
+            </a:r>
+            <a:endParaRPr kumimoji="1" lang="en-US" altLang="ja-JP" dirty="0"/>
+          </a:p>
+          <a:p>
+            <a:r>
+              <a:rPr kumimoji="1" lang="ja-JP" altLang="en-US" dirty="0"/>
+              <a:t>・</a:t>
+            </a:r>
+            <a:r>
+              <a:rPr kumimoji="1" lang="en-US" altLang="ja-JP" dirty="0"/>
+              <a:t>4</a:t>
             </a:r>
             <a:r>
               <a:rPr kumimoji="1" lang="ja-JP" altLang="en-US" dirty="0"/>
@@ -8392,12 +8400,8 @@
               <a:t>=&gt; </a:t>
             </a:r>
             <a:r>
-              <a:rPr kumimoji="1" lang="en-US" altLang="ja-JP" dirty="0" err="1"/>
-              <a:t>BootStrap</a:t>
-            </a:r>
-            <a:r>
               <a:rPr kumimoji="1" lang="ja-JP" altLang="en-US" dirty="0"/>
-              <a:t>勉強</a:t>
+              <a:t>動画制作</a:t>
             </a:r>
             <a:endParaRPr kumimoji="1" lang="en-US" altLang="ja-JP" dirty="0"/>
           </a:p>
@@ -8583,12 +8587,31 @@
           </a:xfrm>
         </p:spPr>
         <p:txBody>
-          <a:bodyPr/>
+          <a:bodyPr>
+            <a:normAutofit fontScale="85000" lnSpcReduction="20000"/>
+          </a:bodyPr>
           <a:lstStyle/>
           <a:p>
             <a:r>
               <a:rPr kumimoji="1" lang="en-US" altLang="ja-JP" dirty="0"/>
-              <a:t>1.</a:t>
+              <a:t>1.Server</a:t>
+            </a:r>
+          </a:p>
+          <a:p>
+            <a:r>
+              <a:rPr kumimoji="1" lang="ja-JP" altLang="en-US" dirty="0"/>
+              <a:t>・</a:t>
+            </a:r>
+            <a:r>
+              <a:rPr kumimoji="1" lang="en-US" altLang="ja-JP"/>
+              <a:t>Ubuntu(AWS)</a:t>
+            </a:r>
+            <a:endParaRPr kumimoji="1" lang="en-US" altLang="ja-JP" dirty="0"/>
+          </a:p>
+          <a:p>
+            <a:r>
+              <a:rPr kumimoji="1" lang="en-US" altLang="ja-JP" dirty="0"/>
+              <a:t>2.</a:t>
             </a:r>
             <a:r>
               <a:rPr kumimoji="1" lang="ja-JP" altLang="en-US" dirty="0"/>
@@ -8610,7 +8633,7 @@
           <a:p>
             <a:r>
               <a:rPr kumimoji="1" lang="en-US" altLang="ja-JP" dirty="0"/>
-              <a:t>2.</a:t>
+              <a:t>3.</a:t>
             </a:r>
             <a:r>
               <a:rPr kumimoji="1" lang="ja-JP" altLang="en-US" dirty="0"/>
@@ -8632,7 +8655,7 @@
           <a:p>
             <a:r>
               <a:rPr kumimoji="1" lang="en-US" altLang="ja-JP" dirty="0"/>
-              <a:t>3.Framework</a:t>
+              <a:t>4.Framework</a:t>
             </a:r>
           </a:p>
           <a:p>
@@ -8649,7 +8672,7 @@
           <a:p>
             <a:r>
               <a:rPr kumimoji="1" lang="en-US" altLang="ja-JP" dirty="0"/>
-              <a:t>4.CSS</a:t>
+              <a:t>5.CSS</a:t>
             </a:r>
           </a:p>
           <a:p>
@@ -8679,165 +8702,6 @@
 </file>
 
 <file path=ppt/slides/slide7.xml><?xml version="1.0" encoding="utf-8"?>
-<p:sld xmlns:a="http://schemas.openxmlformats.org/drawingml/2006/main" xmlns:r="http://schemas.openxmlformats.org/officeDocument/2006/relationships" xmlns:p="http://schemas.openxmlformats.org/presentationml/2006/main">
-  <p:cSld>
-    <p:spTree>
-      <p:nvGrpSpPr>
-        <p:cNvPr id="1" name=""/>
-        <p:cNvGrpSpPr/>
-        <p:nvPr/>
-      </p:nvGrpSpPr>
-      <p:grpSpPr>
-        <a:xfrm>
-          <a:off x="0" y="0"/>
-          <a:ext cx="0" cy="0"/>
-          <a:chOff x="0" y="0"/>
-          <a:chExt cx="0" cy="0"/>
-        </a:xfrm>
-      </p:grpSpPr>
-      <p:sp>
-        <p:nvSpPr>
-          <p:cNvPr id="2" name="Title 1">
-            <a:extLst>
-              <a:ext uri="{FF2B5EF4-FFF2-40B4-BE49-F238E27FC236}">
-                <a16:creationId xmlns:a16="http://schemas.microsoft.com/office/drawing/2014/main" id="{217CA71C-29F3-4773-99DB-965C971B2D4A}"/>
-              </a:ext>
-            </a:extLst>
-          </p:cNvPr>
-          <p:cNvSpPr>
-            <a:spLocks noGrp="1"/>
-          </p:cNvSpPr>
-          <p:nvPr>
-            <p:ph type="title"/>
-          </p:nvPr>
-        </p:nvSpPr>
-        <p:spPr/>
-        <p:txBody>
-          <a:bodyPr/>
-          <a:lstStyle/>
-          <a:p>
-            <a:r>
-              <a:rPr kumimoji="1" lang="ja-JP" altLang="en-US" dirty="0"/>
-              <a:t>懸念点</a:t>
-            </a:r>
-          </a:p>
-        </p:txBody>
-      </p:sp>
-      <p:sp>
-        <p:nvSpPr>
-          <p:cNvPr id="3" name="Content Placeholder 2">
-            <a:extLst>
-              <a:ext uri="{FF2B5EF4-FFF2-40B4-BE49-F238E27FC236}">
-                <a16:creationId xmlns:a16="http://schemas.microsoft.com/office/drawing/2014/main" id="{9B69D589-3EC4-4300-8FF7-5A525B813AAC}"/>
-              </a:ext>
-            </a:extLst>
-          </p:cNvPr>
-          <p:cNvSpPr>
-            <a:spLocks noGrp="1"/>
-          </p:cNvSpPr>
-          <p:nvPr>
-            <p:ph idx="1"/>
-          </p:nvPr>
-        </p:nvSpPr>
-        <p:spPr/>
-        <p:txBody>
-          <a:bodyPr/>
-          <a:lstStyle/>
-          <a:p>
-            <a:r>
-              <a:rPr kumimoji="1" lang="en-US" altLang="ja-JP" dirty="0"/>
-              <a:t>1.</a:t>
-            </a:r>
-            <a:r>
-              <a:rPr kumimoji="1" lang="ja-JP" altLang="en-US" dirty="0"/>
-              <a:t>フロントエンドの</a:t>
-            </a:r>
-            <a:r>
-              <a:rPr kumimoji="1" lang="en-US" altLang="ja-JP" dirty="0"/>
-              <a:t>CSS</a:t>
-            </a:r>
-            <a:r>
-              <a:rPr kumimoji="1" lang="ja-JP" altLang="en-US" dirty="0"/>
-              <a:t>の知識が浅い</a:t>
-            </a:r>
-            <a:br>
-              <a:rPr kumimoji="1" lang="en-US" altLang="ja-JP" dirty="0"/>
-            </a:br>
-            <a:r>
-              <a:rPr kumimoji="1" lang="en-US" altLang="ja-JP" dirty="0"/>
-              <a:t>=&gt;</a:t>
-            </a:r>
-            <a:r>
-              <a:rPr kumimoji="1" lang="ja-JP" altLang="en-US" dirty="0"/>
-              <a:t>今回</a:t>
-            </a:r>
-            <a:r>
-              <a:rPr kumimoji="1" lang="en-US" altLang="ja-JP" dirty="0"/>
-              <a:t>3</a:t>
-            </a:r>
-            <a:r>
-              <a:rPr kumimoji="1" lang="ja-JP" altLang="en-US" dirty="0"/>
-              <a:t>月</a:t>
-            </a:r>
-            <a:r>
-              <a:rPr kumimoji="1" lang="en-US" altLang="ja-JP" dirty="0"/>
-              <a:t>~4</a:t>
-            </a:r>
-            <a:r>
-              <a:rPr kumimoji="1" lang="ja-JP" altLang="en-US" dirty="0"/>
-              <a:t>月で勉強</a:t>
-            </a:r>
-            <a:endParaRPr kumimoji="1" lang="en-US" altLang="ja-JP" dirty="0"/>
-          </a:p>
-          <a:p>
-            <a:endParaRPr kumimoji="1" lang="en-US" altLang="ja-JP" dirty="0"/>
-          </a:p>
-          <a:p>
-            <a:r>
-              <a:rPr kumimoji="1" lang="en-US" altLang="ja-JP" dirty="0"/>
-              <a:t>2.</a:t>
-            </a:r>
-            <a:r>
-              <a:rPr kumimoji="1" lang="ja-JP" altLang="en-US" dirty="0"/>
-              <a:t>一人でインフラがどれくらいできるか分からない。</a:t>
-            </a:r>
-            <a:endParaRPr kumimoji="1" lang="en-US" altLang="ja-JP" dirty="0"/>
-          </a:p>
-          <a:p>
-            <a:r>
-              <a:rPr kumimoji="1" lang="en-US" altLang="ja-JP" dirty="0"/>
-              <a:t>=&gt;</a:t>
-            </a:r>
-            <a:r>
-              <a:rPr kumimoji="1" lang="ja-JP" altLang="en-US" dirty="0"/>
-              <a:t>インフラに</a:t>
-            </a:r>
-            <a:r>
-              <a:rPr kumimoji="1" lang="en-US" altLang="ja-JP" dirty="0"/>
-              <a:t>2</a:t>
-            </a:r>
-            <a:r>
-              <a:rPr kumimoji="1" lang="ja-JP" altLang="en-US" dirty="0"/>
-              <a:t>ヶ月を取る。</a:t>
-            </a:r>
-            <a:endParaRPr kumimoji="1" lang="en-US" altLang="ja-JP" dirty="0"/>
-          </a:p>
-        </p:txBody>
-      </p:sp>
-    </p:spTree>
-    <p:extLst>
-      <p:ext uri="{BB962C8B-B14F-4D97-AF65-F5344CB8AC3E}">
-        <p14:creationId xmlns:p14="http://schemas.microsoft.com/office/powerpoint/2010/main" val="240455178"/>
-      </p:ext>
-    </p:extLst>
-  </p:cSld>
-  <p:clrMapOvr>
-    <a:masterClrMapping/>
-  </p:clrMapOvr>
-</p:sld>
-</file>
-
-<file path=ppt/slides/slide8.xml><?xml version="1.0" encoding="utf-8"?>
 <p:sld xmlns:a="http://schemas.openxmlformats.org/drawingml/2006/main" xmlns:r="http://schemas.openxmlformats.org/officeDocument/2006/relationships" xmlns:p="http://schemas.openxmlformats.org/presentationml/2006/main">
   <p:cSld>
     <p:spTree>

</xml_diff>